<commit_message>
updating file for patient
</commit_message>
<xml_diff>
--- a/docs/ABS.pptx
+++ b/docs/ABS.pptx
@@ -304,7 +304,7 @@
             <a:fld id="{B61BEF0D-F0BB-DE4B-95CE-6DB70DBA9567}" type="datetimeFigureOut">
               <a:rPr lang="en-US" dirty="0"/>
               <a:pPr/>
-              <a:t>1/20/2018</a:t>
+              <a:t>3/4/2018</a:t>
             </a:fld>
             <a:endParaRPr lang="en-US" dirty="0"/>
           </a:p>
@@ -639,7 +639,7 @@
             <a:fld id="{B61BEF0D-F0BB-DE4B-95CE-6DB70DBA9567}" type="datetimeFigureOut">
               <a:rPr lang="en-US" dirty="0"/>
               <a:pPr/>
-              <a:t>1/20/2018</a:t>
+              <a:t>3/4/2018</a:t>
             </a:fld>
             <a:endParaRPr lang="en-US" dirty="0"/>
           </a:p>
@@ -1037,7 +1037,7 @@
             <a:fld id="{B61BEF0D-F0BB-DE4B-95CE-6DB70DBA9567}" type="datetimeFigureOut">
               <a:rPr lang="en-US" dirty="0"/>
               <a:pPr/>
-              <a:t>1/20/2018</a:t>
+              <a:t>3/4/2018</a:t>
             </a:fld>
             <a:endParaRPr lang="en-US" dirty="0"/>
           </a:p>
@@ -1370,7 +1370,7 @@
             <a:fld id="{B61BEF0D-F0BB-DE4B-95CE-6DB70DBA9567}" type="datetimeFigureOut">
               <a:rPr lang="en-US" dirty="0"/>
               <a:pPr/>
-              <a:t>1/20/2018</a:t>
+              <a:t>3/4/2018</a:t>
             </a:fld>
             <a:endParaRPr lang="en-US" dirty="0"/>
           </a:p>
@@ -1687,7 +1687,7 @@
             <a:fld id="{B61BEF0D-F0BB-DE4B-95CE-6DB70DBA9567}" type="datetimeFigureOut">
               <a:rPr lang="en-US" dirty="0"/>
               <a:pPr/>
-              <a:t>1/20/2018</a:t>
+              <a:t>3/4/2018</a:t>
             </a:fld>
             <a:endParaRPr lang="en-US" dirty="0"/>
           </a:p>
@@ -2080,7 +2080,7 @@
             <a:fld id="{B61BEF0D-F0BB-DE4B-95CE-6DB70DBA9567}" type="datetimeFigureOut">
               <a:rPr lang="en-US" dirty="0"/>
               <a:pPr/>
-              <a:t>1/20/2018</a:t>
+              <a:t>3/4/2018</a:t>
             </a:fld>
             <a:endParaRPr lang="en-US" dirty="0"/>
           </a:p>
@@ -2334,7 +2334,7 @@
             <a:fld id="{B61BEF0D-F0BB-DE4B-95CE-6DB70DBA9567}" type="datetimeFigureOut">
               <a:rPr lang="en-US" dirty="0"/>
               <a:pPr/>
-              <a:t>1/20/2018</a:t>
+              <a:t>3/4/2018</a:t>
             </a:fld>
             <a:endParaRPr lang="en-US" dirty="0"/>
           </a:p>
@@ -2593,7 +2593,7 @@
             <a:fld id="{B61BEF0D-F0BB-DE4B-95CE-6DB70DBA9567}" type="datetimeFigureOut">
               <a:rPr lang="en-US" dirty="0"/>
               <a:pPr/>
-              <a:t>1/20/2018</a:t>
+              <a:t>3/4/2018</a:t>
             </a:fld>
             <a:endParaRPr lang="en-US" dirty="0"/>
           </a:p>
@@ -2852,7 +2852,7 @@
             <a:fld id="{B61BEF0D-F0BB-DE4B-95CE-6DB70DBA9567}" type="datetimeFigureOut">
               <a:rPr lang="en-US" dirty="0"/>
               <a:pPr/>
-              <a:t>1/20/2018</a:t>
+              <a:t>3/4/2018</a:t>
             </a:fld>
             <a:endParaRPr lang="en-US" dirty="0"/>
           </a:p>
@@ -3178,7 +3178,7 @@
             <a:fld id="{B61BEF0D-F0BB-DE4B-95CE-6DB70DBA9567}" type="datetimeFigureOut">
               <a:rPr lang="en-US" dirty="0"/>
               <a:pPr/>
-              <a:t>1/20/2018</a:t>
+              <a:t>3/4/2018</a:t>
             </a:fld>
             <a:endParaRPr lang="en-US" dirty="0"/>
           </a:p>
@@ -3498,7 +3498,7 @@
             <a:fld id="{B61BEF0D-F0BB-DE4B-95CE-6DB70DBA9567}" type="datetimeFigureOut">
               <a:rPr lang="en-US" dirty="0"/>
               <a:pPr/>
-              <a:t>1/20/2018</a:t>
+              <a:t>3/4/2018</a:t>
             </a:fld>
             <a:endParaRPr lang="en-US" dirty="0"/>
           </a:p>
@@ -3952,7 +3952,7 @@
             <a:fld id="{B61BEF0D-F0BB-DE4B-95CE-6DB70DBA9567}" type="datetimeFigureOut">
               <a:rPr lang="en-US" dirty="0"/>
               <a:pPr/>
-              <a:t>1/20/2018</a:t>
+              <a:t>3/4/2018</a:t>
             </a:fld>
             <a:endParaRPr lang="en-US" dirty="0"/>
           </a:p>
@@ -4154,7 +4154,7 @@
             <a:fld id="{B61BEF0D-F0BB-DE4B-95CE-6DB70DBA9567}" type="datetimeFigureOut">
               <a:rPr lang="en-US" dirty="0"/>
               <a:pPr/>
-              <a:t>1/20/2018</a:t>
+              <a:t>3/4/2018</a:t>
             </a:fld>
             <a:endParaRPr lang="en-US" dirty="0"/>
           </a:p>
@@ -4328,7 +4328,7 @@
             <a:fld id="{B61BEF0D-F0BB-DE4B-95CE-6DB70DBA9567}" type="datetimeFigureOut">
               <a:rPr lang="en-US" dirty="0"/>
               <a:pPr/>
-              <a:t>1/20/2018</a:t>
+              <a:t>3/4/2018</a:t>
             </a:fld>
             <a:endParaRPr lang="en-US" dirty="0"/>
           </a:p>
@@ -4658,7 +4658,7 @@
             <a:fld id="{B61BEF0D-F0BB-DE4B-95CE-6DB70DBA9567}" type="datetimeFigureOut">
               <a:rPr lang="en-US" dirty="0"/>
               <a:pPr/>
-              <a:t>1/20/2018</a:t>
+              <a:t>3/4/2018</a:t>
             </a:fld>
             <a:endParaRPr lang="en-US" dirty="0"/>
           </a:p>
@@ -5000,7 +5000,7 @@
             <a:fld id="{B61BEF0D-F0BB-DE4B-95CE-6DB70DBA9567}" type="datetimeFigureOut">
               <a:rPr lang="en-US" dirty="0"/>
               <a:pPr/>
-              <a:t>1/20/2018</a:t>
+              <a:t>3/4/2018</a:t>
             </a:fld>
             <a:endParaRPr lang="en-US" dirty="0"/>
           </a:p>
@@ -7114,7 +7114,7 @@
             <a:fld id="{B61BEF0D-F0BB-DE4B-95CE-6DB70DBA9567}" type="datetimeFigureOut">
               <a:rPr lang="en-US" dirty="0"/>
               <a:pPr/>
-              <a:t>1/20/2018</a:t>
+              <a:t>3/4/2018</a:t>
             </a:fld>
             <a:endParaRPr lang="en-US" dirty="0"/>
           </a:p>
@@ -8235,8 +8235,8 @@
         </p:nvSpPr>
         <p:spPr>
           <a:xfrm>
-            <a:off x="1790212" y="1285509"/>
-            <a:ext cx="2009056" cy="3028913"/>
+            <a:off x="1958276" y="3443415"/>
+            <a:ext cx="2009056" cy="2957385"/>
           </a:xfrm>
           <a:prstGeom prst="rect">
             <a:avLst/>
@@ -8263,67 +8263,64 @@
           <a:lstStyle/>
           <a:p>
             <a:r>
-              <a:rPr lang="en-GB" sz="1600" dirty="0" err="1"/>
-              <a:t>PatientID</a:t>
-            </a:r>
-            <a:endParaRPr lang="en-GB" sz="1600" dirty="0"/>
-          </a:p>
-          <a:p>
-            <a:r>
-              <a:rPr lang="en-GB" sz="1600" dirty="0" err="1"/>
-              <a:t>PatientName</a:t>
-            </a:r>
-            <a:endParaRPr lang="en-GB" sz="1600" dirty="0"/>
-          </a:p>
-          <a:p>
-            <a:r>
-              <a:rPr lang="en-GB" sz="1600" dirty="0" err="1"/>
-              <a:t>Emaill</a:t>
-            </a:r>
-            <a:endParaRPr lang="en-GB" sz="1600" dirty="0"/>
-          </a:p>
-          <a:p>
-            <a:r>
-              <a:rPr lang="en-GB" sz="1600" dirty="0"/>
-              <a:t>Mobile </a:t>
-            </a:r>
-          </a:p>
-          <a:p>
-            <a:r>
-              <a:rPr lang="en-GB" sz="1600" dirty="0"/>
+              <a:rPr lang="en-US" sz="1600" dirty="0" err="1" smtClean="0"/>
+              <a:t>Patient</a:t>
+            </a:r>
+            <a:r>
+              <a:rPr lang="en-US" sz="1600" dirty="0" err="1" smtClean="0"/>
+              <a:t>ID</a:t>
+            </a:r>
+            <a:endParaRPr lang="en-US" sz="1600" dirty="0" smtClean="0"/>
+          </a:p>
+          <a:p>
+            <a:r>
+              <a:rPr lang="en-US" sz="1600" dirty="0" err="1" smtClean="0"/>
+              <a:t>FKRegisterationID</a:t>
+            </a:r>
+            <a:endParaRPr lang="en-US" sz="1600" dirty="0" smtClean="0"/>
+          </a:p>
+          <a:p>
+            <a:r>
+              <a:rPr lang="en-US" sz="1600" dirty="0" smtClean="0"/>
+              <a:t>Name</a:t>
+            </a:r>
+          </a:p>
+          <a:p>
+            <a:r>
+              <a:rPr lang="en-US" sz="1600" dirty="0" smtClean="0"/>
+              <a:t>Gender</a:t>
+            </a:r>
+          </a:p>
+          <a:p>
+            <a:r>
+              <a:rPr lang="en-US" sz="1600" dirty="0" smtClean="0"/>
+              <a:t>Address</a:t>
+            </a:r>
+          </a:p>
+          <a:p>
+            <a:r>
+              <a:rPr lang="en-US" sz="1600" dirty="0" smtClean="0"/>
+              <a:t>PIN</a:t>
+            </a:r>
+          </a:p>
+          <a:p>
+            <a:r>
+              <a:rPr lang="en-US" sz="1600" dirty="0" smtClean="0"/>
+              <a:t>Email</a:t>
+            </a:r>
+          </a:p>
+          <a:p>
+            <a:r>
+              <a:rPr lang="en-US" sz="1600" dirty="0" smtClean="0"/>
               <a:t>DOB</a:t>
             </a:r>
           </a:p>
           <a:p>
             <a:r>
-              <a:rPr lang="en-GB" sz="1600" dirty="0"/>
-              <a:t>Gender </a:t>
-            </a:r>
-          </a:p>
-          <a:p>
-            <a:r>
-              <a:rPr lang="en-GB" sz="1600" dirty="0"/>
-              <a:t>Nationality</a:t>
-            </a:r>
-          </a:p>
-          <a:p>
-            <a:r>
-              <a:rPr lang="en-GB" sz="1600" dirty="0"/>
-              <a:t>Address</a:t>
-            </a:r>
-          </a:p>
-          <a:p>
-            <a:r>
-              <a:rPr lang="en-GB" sz="1600" dirty="0"/>
-              <a:t>Pin</a:t>
-            </a:r>
-          </a:p>
-          <a:p>
-            <a:r>
-              <a:rPr lang="en-GB" sz="1600" dirty="0" err="1" smtClean="0"/>
-              <a:t>DateOfUpdation</a:t>
-            </a:r>
-            <a:endParaRPr lang="en-GB" sz="1600" dirty="0" smtClean="0"/>
+              <a:rPr lang="en-US" sz="1600" dirty="0" err="1" smtClean="0"/>
+              <a:t>OtherContact</a:t>
+            </a:r>
+            <a:endParaRPr lang="en-US" sz="1600" dirty="0" smtClean="0"/>
           </a:p>
           <a:p>
             <a:r>
@@ -8334,7 +8331,14 @@
           <a:p>
             <a:r>
               <a:rPr lang="en-US" sz="1600" dirty="0" err="1" smtClean="0"/>
-              <a:t>FkRegistrationID</a:t>
+              <a:t>LastUpdate</a:t>
+            </a:r>
+            <a:endParaRPr lang="en-US" sz="1600" dirty="0" smtClean="0"/>
+          </a:p>
+          <a:p>
+            <a:r>
+              <a:rPr lang="en-US" sz="1600" dirty="0" smtClean="0"/>
+              <a:t>Status</a:t>
             </a:r>
             <a:endParaRPr lang="en-GB" sz="1600" dirty="0"/>
           </a:p>
@@ -8348,8 +8352,8 @@
         </p:nvSpPr>
         <p:spPr>
           <a:xfrm>
-            <a:off x="4519327" y="1285510"/>
-            <a:ext cx="2057501" cy="4574377"/>
+            <a:off x="4218899" y="1285510"/>
+            <a:ext cx="2057501" cy="2616788"/>
           </a:xfrm>
           <a:prstGeom prst="rect">
             <a:avLst/>
@@ -8376,8 +8380,15 @@
           <a:lstStyle/>
           <a:p>
             <a:r>
-              <a:rPr lang="en-GB" sz="1600" dirty="0" err="1"/>
+              <a:rPr lang="en-GB" sz="1600" dirty="0" err="1" smtClean="0"/>
               <a:t>DrID</a:t>
+            </a:r>
+            <a:endParaRPr lang="en-GB" sz="1600" dirty="0" smtClean="0"/>
+          </a:p>
+          <a:p>
+            <a:r>
+              <a:rPr lang="en-US" sz="1600" dirty="0" err="1" smtClean="0"/>
+              <a:t>FKRegisterationID</a:t>
             </a:r>
             <a:endParaRPr lang="en-GB" sz="1600" dirty="0"/>
           </a:p>
@@ -8390,61 +8401,14 @@
           </a:p>
           <a:p>
             <a:r>
-              <a:rPr lang="en-GB" sz="1600" dirty="0" err="1"/>
-              <a:t>DrName</a:t>
+              <a:rPr lang="en-GB" sz="1600" dirty="0" err="1" smtClean="0"/>
+              <a:t>TotalExperience</a:t>
             </a:r>
             <a:endParaRPr lang="en-GB" sz="1600" dirty="0"/>
           </a:p>
           <a:p>
             <a:r>
-              <a:rPr lang="en-GB" sz="1600" dirty="0" err="1"/>
-              <a:t>DrDOB</a:t>
-            </a:r>
-            <a:endParaRPr lang="en-GB" sz="1600" dirty="0"/>
-          </a:p>
-          <a:p>
-            <a:r>
-              <a:rPr lang="en-GB" sz="1600" dirty="0"/>
-              <a:t>Gender</a:t>
-            </a:r>
-          </a:p>
-          <a:p>
-            <a:r>
-              <a:rPr lang="en-GB" sz="1600" dirty="0" err="1"/>
-              <a:t>DrMobile</a:t>
-            </a:r>
-            <a:endParaRPr lang="en-GB" sz="1600" dirty="0"/>
-          </a:p>
-          <a:p>
-            <a:r>
-              <a:rPr lang="en-GB" sz="1600" dirty="0" err="1"/>
-              <a:t>DrPhone</a:t>
-            </a:r>
-            <a:endParaRPr lang="en-GB" sz="1600" dirty="0"/>
-          </a:p>
-          <a:p>
-            <a:r>
-              <a:rPr lang="en-GB" sz="1600" dirty="0" err="1"/>
-              <a:t>DrAddress</a:t>
-            </a:r>
-            <a:endParaRPr lang="en-GB" sz="1600" dirty="0"/>
-          </a:p>
-          <a:p>
-            <a:r>
-              <a:rPr lang="en-GB" sz="1600" dirty="0" err="1"/>
-              <a:t>TotalExperience</a:t>
-            </a:r>
-            <a:endParaRPr lang="en-GB" sz="1600" dirty="0"/>
-          </a:p>
-          <a:p>
-            <a:r>
-              <a:rPr lang="en-GB" sz="1600" dirty="0"/>
-              <a:t>Nationality</a:t>
-            </a:r>
-          </a:p>
-          <a:p>
-            <a:r>
-              <a:rPr lang="en-GB" sz="1600" dirty="0" err="1"/>
+              <a:rPr lang="en-GB" sz="1600" dirty="0" err="1" smtClean="0"/>
               <a:t>Specility</a:t>
             </a:r>
             <a:endParaRPr lang="en-GB" sz="1600" dirty="0"/>
@@ -8471,27 +8435,15 @@
           </a:p>
           <a:p>
             <a:r>
-              <a:rPr lang="en-GB" sz="1600" dirty="0"/>
+              <a:rPr lang="en-GB" sz="1600" dirty="0" smtClean="0"/>
               <a:t>Fee</a:t>
             </a:r>
-          </a:p>
-          <a:p>
-            <a:r>
-              <a:rPr lang="en-GB" sz="1600" dirty="0" smtClean="0"/>
-              <a:t>Availability</a:t>
-            </a:r>
-          </a:p>
-          <a:p>
-            <a:r>
-              <a:rPr lang="en-US" sz="1600" dirty="0" smtClean="0"/>
-              <a:t>Image</a:t>
-            </a:r>
-            <a:endParaRPr lang="en-GB" sz="1600" dirty="0"/>
-          </a:p>
-          <a:p>
-            <a:r>
-              <a:rPr lang="en-GB" sz="1600" dirty="0" err="1"/>
-              <a:t>DateOfUpdation</a:t>
+            <a:endParaRPr lang="en-GB" sz="1600" dirty="0" smtClean="0"/>
+          </a:p>
+          <a:p>
+            <a:r>
+              <a:rPr lang="en-US" sz="1600" dirty="0" err="1" smtClean="0"/>
+              <a:t>LastUpdate</a:t>
             </a:r>
             <a:endParaRPr lang="en-GB" sz="1600" dirty="0"/>
           </a:p>
@@ -8505,8 +8457,8 @@
         </p:nvSpPr>
         <p:spPr>
           <a:xfrm>
-            <a:off x="7122714" y="1285510"/>
-            <a:ext cx="2046850" cy="2415978"/>
+            <a:off x="4229550" y="4146323"/>
+            <a:ext cx="2046850" cy="891020"/>
           </a:xfrm>
           <a:prstGeom prst="rect">
             <a:avLst/>
@@ -8547,44 +8499,8 @@
           </a:p>
           <a:p>
             <a:r>
-              <a:rPr lang="en-GB" sz="1600" dirty="0"/>
-              <a:t>Name</a:t>
-            </a:r>
-          </a:p>
-          <a:p>
-            <a:r>
-              <a:rPr lang="en-GB" sz="1600" dirty="0"/>
-              <a:t>Mobile</a:t>
-            </a:r>
-          </a:p>
-          <a:p>
-            <a:r>
-              <a:rPr lang="en-GB" sz="1600" dirty="0"/>
-              <a:t>DOB</a:t>
-            </a:r>
-          </a:p>
-          <a:p>
-            <a:r>
-              <a:rPr lang="en-GB" sz="1600" dirty="0"/>
-              <a:t>Gender</a:t>
-            </a:r>
-          </a:p>
-          <a:p>
-            <a:r>
-              <a:rPr lang="en-GB" sz="1600" dirty="0"/>
-              <a:t>Nationality</a:t>
-            </a:r>
-          </a:p>
-          <a:p>
-            <a:r>
-              <a:rPr lang="en-GB" sz="1600" dirty="0"/>
-              <a:t>Address</a:t>
-            </a:r>
-          </a:p>
-          <a:p>
-            <a:r>
-              <a:rPr lang="en-GB" sz="1600" dirty="0" err="1"/>
-              <a:t>DateOfUpdation</a:t>
+              <a:rPr lang="en-GB" sz="1600" dirty="0" err="1" smtClean="0"/>
+              <a:t>LastUpdate</a:t>
             </a:r>
             <a:endParaRPr lang="en-GB" sz="1600" dirty="0"/>
           </a:p>
@@ -8598,7 +8514,7 @@
         </p:nvSpPr>
         <p:spPr>
           <a:xfrm>
-            <a:off x="9715450" y="1285510"/>
+            <a:off x="9019991" y="1306736"/>
             <a:ext cx="2152357" cy="1979879"/>
           </a:xfrm>
           <a:prstGeom prst="rect">
@@ -8682,7 +8598,7 @@
         </p:nvSpPr>
         <p:spPr>
           <a:xfrm>
-            <a:off x="9715450" y="3597962"/>
+            <a:off x="9019991" y="3597962"/>
             <a:ext cx="2152357" cy="3031588"/>
           </a:xfrm>
           <a:prstGeom prst="rect">
@@ -8790,8 +8706,8 @@
         </p:nvSpPr>
         <p:spPr>
           <a:xfrm>
-            <a:off x="7122714" y="3902299"/>
-            <a:ext cx="2046850" cy="2612033"/>
+            <a:off x="6708362" y="3597962"/>
+            <a:ext cx="2046850" cy="2892990"/>
           </a:xfrm>
           <a:prstGeom prst="rect">
             <a:avLst/>
@@ -8825,41 +8741,42 @@
           </a:p>
           <a:p>
             <a:r>
-              <a:rPr lang="en-GB" sz="1600" dirty="0" err="1"/>
+              <a:rPr lang="en-GB" sz="1600" dirty="0" err="1" smtClean="0"/>
               <a:t>FkDrId</a:t>
             </a:r>
+            <a:endParaRPr lang="en-GB" sz="1600" dirty="0" smtClean="0"/>
+          </a:p>
+          <a:p>
+            <a:r>
+              <a:rPr lang="en-GB" sz="1600" dirty="0" err="1" smtClean="0"/>
+              <a:t>AppoTime</a:t>
+            </a:r>
             <a:endParaRPr lang="en-GB" sz="1600" dirty="0"/>
           </a:p>
           <a:p>
             <a:r>
-              <a:rPr lang="en-GB" sz="1600" dirty="0" err="1"/>
+              <a:rPr lang="en-US" sz="1600" dirty="0" err="1" smtClean="0"/>
+              <a:t>IsPatientRegistered</a:t>
+            </a:r>
+            <a:endParaRPr lang="en-US" sz="1600" dirty="0" smtClean="0"/>
+          </a:p>
+          <a:p>
+            <a:r>
+              <a:rPr lang="en-GB" sz="1600" dirty="0" err="1" smtClean="0"/>
               <a:t>FKPatientID</a:t>
             </a:r>
+            <a:endParaRPr lang="en-US" sz="1600" dirty="0" smtClean="0"/>
+          </a:p>
+          <a:p>
+            <a:r>
+              <a:rPr lang="en-US" sz="1600" dirty="0" err="1" smtClean="0"/>
+              <a:t>PatientName</a:t>
+            </a:r>
             <a:endParaRPr lang="en-GB" sz="1600" dirty="0"/>
           </a:p>
           <a:p>
             <a:r>
-              <a:rPr lang="en-GB" sz="1600" dirty="0" err="1"/>
-              <a:t>FkComponderID</a:t>
-            </a:r>
-            <a:endParaRPr lang="en-GB" sz="1600" dirty="0"/>
-          </a:p>
-          <a:p>
-            <a:r>
-              <a:rPr lang="en-GB" sz="1600" dirty="0" err="1"/>
-              <a:t>AppoTime</a:t>
-            </a:r>
-            <a:endParaRPr lang="en-GB" sz="1600" dirty="0"/>
-          </a:p>
-          <a:p>
-            <a:r>
-              <a:rPr lang="en-GB" sz="1600" dirty="0"/>
-              <a:t>Location</a:t>
-            </a:r>
-          </a:p>
-          <a:p>
-            <a:r>
-              <a:rPr lang="en-GB" sz="1600" dirty="0" err="1"/>
+              <a:rPr lang="en-GB" sz="1600" dirty="0" err="1" smtClean="0"/>
               <a:t>IsNewPatient</a:t>
             </a:r>
             <a:endParaRPr lang="en-GB" sz="1600" dirty="0"/>
@@ -8874,15 +8791,25 @@
           <a:p>
             <a:r>
               <a:rPr lang="en-US" sz="1600" dirty="0" err="1" smtClean="0"/>
-              <a:t>IsPaid</a:t>
+              <a:t>PaidFee</a:t>
             </a:r>
             <a:endParaRPr lang="en-GB" sz="1600" dirty="0"/>
           </a:p>
           <a:p>
             <a:r>
-              <a:rPr lang="en-GB" sz="1600" dirty="0" err="1"/>
+              <a:rPr lang="en-US" sz="1600" dirty="0" smtClean="0"/>
+              <a:t>Status</a:t>
+            </a:r>
+            <a:endParaRPr lang="en-GB" sz="1600" dirty="0" smtClean="0"/>
+          </a:p>
+          <a:p>
+            <a:r>
+              <a:rPr lang="en-GB" sz="1600" dirty="0" err="1" smtClean="0"/>
               <a:t>TimeStamp</a:t>
             </a:r>
+            <a:endParaRPr lang="en-GB" sz="1600" dirty="0" smtClean="0"/>
+          </a:p>
+          <a:p>
             <a:endParaRPr lang="en-GB" sz="1600" dirty="0"/>
           </a:p>
         </p:txBody>
@@ -8895,7 +8822,7 @@
         </p:nvSpPr>
         <p:spPr>
           <a:xfrm>
-            <a:off x="1762076" y="4490203"/>
+            <a:off x="1964385" y="1285510"/>
             <a:ext cx="2009056" cy="2024130"/>
           </a:xfrm>
           <a:prstGeom prst="rect">
@@ -8949,8 +8876,19 @@
           </a:p>
           <a:p>
             <a:r>
+              <a:rPr lang="en-US" sz="1600" dirty="0" err="1" smtClean="0"/>
+              <a:t>UserType</a:t>
+            </a:r>
+            <a:endParaRPr lang="en-US" sz="1600" dirty="0" smtClean="0"/>
+          </a:p>
+          <a:p>
+            <a:r>
               <a:rPr lang="en-US" sz="1600" dirty="0" smtClean="0"/>
-              <a:t>Registration Date</a:t>
+              <a:t>Registration </a:t>
+            </a:r>
+            <a:r>
+              <a:rPr lang="en-US" sz="1600" dirty="0" smtClean="0"/>
+              <a:t>Date</a:t>
             </a:r>
           </a:p>
           <a:p>
@@ -8964,6 +8902,90 @@
             <a:r>
               <a:rPr lang="en-US" sz="1600" dirty="0" err="1" smtClean="0"/>
               <a:t>isPaid</a:t>
+            </a:r>
+            <a:endParaRPr lang="en-US" sz="1600" dirty="0" smtClean="0"/>
+          </a:p>
+        </p:txBody>
+      </p:sp>
+      <p:sp>
+        <p:nvSpPr>
+          <p:cNvPr id="14" name="Rectangle 13"/>
+          <p:cNvSpPr/>
+          <p:nvPr/>
+        </p:nvSpPr>
+        <p:spPr>
+          <a:xfrm>
+            <a:off x="6697711" y="1306736"/>
+            <a:ext cx="2057501" cy="2020967"/>
+          </a:xfrm>
+          <a:prstGeom prst="rect">
+            <a:avLst/>
+          </a:prstGeom>
+        </p:spPr>
+        <p:style>
+          <a:lnRef idx="2">
+            <a:schemeClr val="accent1">
+              <a:shade val="50000"/>
+            </a:schemeClr>
+          </a:lnRef>
+          <a:fillRef idx="1">
+            <a:schemeClr val="accent1"/>
+          </a:fillRef>
+          <a:effectRef idx="0">
+            <a:schemeClr val="accent1"/>
+          </a:effectRef>
+          <a:fontRef idx="minor">
+            <a:schemeClr val="lt1"/>
+          </a:fontRef>
+        </p:style>
+        <p:txBody>
+          <a:bodyPr rtlCol="0" anchor="ctr"/>
+          <a:lstStyle/>
+          <a:p>
+            <a:r>
+              <a:rPr lang="en-US" sz="1600" dirty="0" err="1" smtClean="0"/>
+              <a:t>FKDrID</a:t>
+            </a:r>
+            <a:endParaRPr lang="en-US" sz="1600" dirty="0" smtClean="0"/>
+          </a:p>
+          <a:p>
+            <a:r>
+              <a:rPr lang="en-US" sz="1600" dirty="0" smtClean="0"/>
+              <a:t>Date</a:t>
+            </a:r>
+          </a:p>
+          <a:p>
+            <a:r>
+              <a:rPr lang="en-US" sz="1600" dirty="0" err="1" smtClean="0"/>
+              <a:t>Availablity</a:t>
+            </a:r>
+            <a:endParaRPr lang="en-US" sz="1600" dirty="0" smtClean="0"/>
+          </a:p>
+          <a:p>
+            <a:r>
+              <a:rPr lang="en-US" sz="1600" dirty="0" err="1" smtClean="0"/>
+              <a:t>AvailableLocation</a:t>
+            </a:r>
+            <a:endParaRPr lang="en-GB" sz="1600" dirty="0"/>
+          </a:p>
+          <a:p>
+            <a:r>
+              <a:rPr lang="en-US" sz="1600" dirty="0" err="1" smtClean="0"/>
+              <a:t>NewPQueueSize</a:t>
+            </a:r>
+            <a:endParaRPr lang="en-US" sz="1600" dirty="0" smtClean="0"/>
+          </a:p>
+          <a:p>
+            <a:r>
+              <a:rPr lang="en-US" sz="1600" dirty="0" err="1" smtClean="0"/>
+              <a:t>OldPQueueSize</a:t>
+            </a:r>
+            <a:endParaRPr lang="en-US" sz="1600" dirty="0" smtClean="0"/>
+          </a:p>
+          <a:p>
+            <a:r>
+              <a:rPr lang="en-US" sz="1600" dirty="0" err="1" smtClean="0"/>
+              <a:t>LastUpdate</a:t>
             </a:r>
             <a:endParaRPr lang="en-US" sz="1600" dirty="0" smtClean="0"/>
           </a:p>

</xml_diff>